<commit_message>
Updated photodetection in FD and TD
</commit_message>
<xml_diff>
--- a/Presentations/2CompanyVisit1.pptx
+++ b/Presentations/2CompanyVisit1.pptx
@@ -3706,14 +3706,16 @@
         </p:nvSpPr>
         <p:spPr/>
         <p:txBody>
-          <a:bodyPr/>
-          <a:lstStyle/>
-          <a:p>
-            <a:r>
-              <a:rPr lang="en-US" dirty="0"/>
+          <a:bodyPr>
+            <a:normAutofit/>
+          </a:bodyPr>
+          <a:lstStyle/>
+          <a:p>
+            <a:r>
+              <a:rPr lang="en-US" sz="4400" dirty="0"/>
               <a:t>Progress</a:t>
             </a:r>
-            <a:endParaRPr lang="en-NL" dirty="0"/>
+            <a:endParaRPr lang="en-NL" sz="4400" dirty="0"/>
           </a:p>
         </p:txBody>
       </p:sp>
@@ -3766,7 +3768,9 @@
         </p:nvSpPr>
         <p:spPr/>
         <p:txBody>
-          <a:bodyPr/>
+          <a:bodyPr>
+            <a:normAutofit/>
+          </a:bodyPr>
           <a:lstStyle/>
           <a:p>
             <a:pPr marL="285750" indent="-285750">
@@ -3774,7 +3778,7 @@
               <a:buChar char="•"/>
             </a:pPr>
             <a:r>
-              <a:rPr lang="en-US" dirty="0"/>
+              <a:rPr lang="en-US" sz="2800" dirty="0"/>
               <a:t>Photodetection PCB design and implementation</a:t>
             </a:r>
           </a:p>
@@ -3784,7 +3788,7 @@
               <a:buChar char="•"/>
             </a:pPr>
             <a:r>
-              <a:rPr lang="en-US" dirty="0"/>
+              <a:rPr lang="en-US" sz="2800" dirty="0"/>
               <a:t>TTL generation script</a:t>
             </a:r>
           </a:p>
@@ -3794,7 +3798,7 @@
               <a:buChar char="•"/>
             </a:pPr>
             <a:r>
-              <a:rPr lang="en-US" dirty="0"/>
+              <a:rPr lang="en-US" sz="2800" dirty="0"/>
               <a:t>Sensing setup functionality testing</a:t>
             </a:r>
           </a:p>
@@ -3804,7 +3808,7 @@
               <a:buChar char="•"/>
             </a:pPr>
             <a:r>
-              <a:rPr lang="en-US" dirty="0"/>
+              <a:rPr lang="en-US" sz="2400" dirty="0"/>
               <a:t>Driver tests</a:t>
             </a:r>
           </a:p>
@@ -3814,7 +3818,7 @@
               <a:buChar char="•"/>
             </a:pPr>
             <a:r>
-              <a:rPr lang="en-US" dirty="0"/>
+              <a:rPr lang="en-US" sz="2400" dirty="0"/>
               <a:t>Lock-in tests</a:t>
             </a:r>
           </a:p>

</xml_diff>